<commit_message>
listaGazFiles.txt viene salvata come file vuoto
</commit_message>
<xml_diff>
--- a/FlowDiagram.pptx
+++ b/FlowDiagram.pptx
@@ -288,7 +288,7 @@
           <a:p>
             <a:fld id="{AB513B0F-27F6-4823-A85B-BB3CFE0DE5B8}" type="datetimeFigureOut">
               <a:rPr lang="it-IT" smtClean="0"/>
-              <a:t>16/11/2011</a:t>
+              <a:t>17/11/2011</a:t>
             </a:fld>
             <a:endParaRPr lang="it-IT"/>
           </a:p>
@@ -458,7 +458,7 @@
           <a:p>
             <a:fld id="{AB513B0F-27F6-4823-A85B-BB3CFE0DE5B8}" type="datetimeFigureOut">
               <a:rPr lang="it-IT" smtClean="0"/>
-              <a:t>16/11/2011</a:t>
+              <a:t>17/11/2011</a:t>
             </a:fld>
             <a:endParaRPr lang="it-IT"/>
           </a:p>
@@ -638,7 +638,7 @@
           <a:p>
             <a:fld id="{AB513B0F-27F6-4823-A85B-BB3CFE0DE5B8}" type="datetimeFigureOut">
               <a:rPr lang="it-IT" smtClean="0"/>
-              <a:t>16/11/2011</a:t>
+              <a:t>17/11/2011</a:t>
             </a:fld>
             <a:endParaRPr lang="it-IT"/>
           </a:p>
@@ -808,7 +808,7 @@
           <a:p>
             <a:fld id="{AB513B0F-27F6-4823-A85B-BB3CFE0DE5B8}" type="datetimeFigureOut">
               <a:rPr lang="it-IT" smtClean="0"/>
-              <a:t>16/11/2011</a:t>
+              <a:t>17/11/2011</a:t>
             </a:fld>
             <a:endParaRPr lang="it-IT"/>
           </a:p>
@@ -1054,7 +1054,7 @@
           <a:p>
             <a:fld id="{AB513B0F-27F6-4823-A85B-BB3CFE0DE5B8}" type="datetimeFigureOut">
               <a:rPr lang="it-IT" smtClean="0"/>
-              <a:t>16/11/2011</a:t>
+              <a:t>17/11/2011</a:t>
             </a:fld>
             <a:endParaRPr lang="it-IT"/>
           </a:p>
@@ -1342,7 +1342,7 @@
           <a:p>
             <a:fld id="{AB513B0F-27F6-4823-A85B-BB3CFE0DE5B8}" type="datetimeFigureOut">
               <a:rPr lang="it-IT" smtClean="0"/>
-              <a:t>16/11/2011</a:t>
+              <a:t>17/11/2011</a:t>
             </a:fld>
             <a:endParaRPr lang="it-IT"/>
           </a:p>
@@ -1764,7 +1764,7 @@
           <a:p>
             <a:fld id="{AB513B0F-27F6-4823-A85B-BB3CFE0DE5B8}" type="datetimeFigureOut">
               <a:rPr lang="it-IT" smtClean="0"/>
-              <a:t>16/11/2011</a:t>
+              <a:t>17/11/2011</a:t>
             </a:fld>
             <a:endParaRPr lang="it-IT"/>
           </a:p>
@@ -1882,7 +1882,7 @@
           <a:p>
             <a:fld id="{AB513B0F-27F6-4823-A85B-BB3CFE0DE5B8}" type="datetimeFigureOut">
               <a:rPr lang="it-IT" smtClean="0"/>
-              <a:t>16/11/2011</a:t>
+              <a:t>17/11/2011</a:t>
             </a:fld>
             <a:endParaRPr lang="it-IT"/>
           </a:p>
@@ -1977,7 +1977,7 @@
           <a:p>
             <a:fld id="{AB513B0F-27F6-4823-A85B-BB3CFE0DE5B8}" type="datetimeFigureOut">
               <a:rPr lang="it-IT" smtClean="0"/>
-              <a:t>16/11/2011</a:t>
+              <a:t>17/11/2011</a:t>
             </a:fld>
             <a:endParaRPr lang="it-IT"/>
           </a:p>
@@ -2254,7 +2254,7 @@
           <a:p>
             <a:fld id="{AB513B0F-27F6-4823-A85B-BB3CFE0DE5B8}" type="datetimeFigureOut">
               <a:rPr lang="it-IT" smtClean="0"/>
-              <a:t>16/11/2011</a:t>
+              <a:t>17/11/2011</a:t>
             </a:fld>
             <a:endParaRPr lang="it-IT"/>
           </a:p>
@@ -2507,7 +2507,7 @@
           <a:p>
             <a:fld id="{AB513B0F-27F6-4823-A85B-BB3CFE0DE5B8}" type="datetimeFigureOut">
               <a:rPr lang="it-IT" smtClean="0"/>
-              <a:t>16/11/2011</a:t>
+              <a:t>17/11/2011</a:t>
             </a:fld>
             <a:endParaRPr lang="it-IT"/>
           </a:p>
@@ -2720,7 +2720,7 @@
           <a:p>
             <a:fld id="{AB513B0F-27F6-4823-A85B-BB3CFE0DE5B8}" type="datetimeFigureOut">
               <a:rPr lang="it-IT" smtClean="0"/>
-              <a:t>16/11/2011</a:t>
+              <a:t>17/11/2011</a:t>
             </a:fld>
             <a:endParaRPr lang="it-IT"/>
           </a:p>
@@ -3220,50 +3220,6 @@
           </a:fontRef>
         </p:style>
       </p:cxnSp>
-      <p:sp>
-        <p:nvSpPr>
-          <p:cNvPr id="17" name="Flowchart: Decision 16"/>
-          <p:cNvSpPr/>
-          <p:nvPr/>
-        </p:nvSpPr>
-        <p:spPr>
-          <a:xfrm>
-            <a:off x="1847251" y="1871499"/>
-            <a:ext cx="1338773" cy="694333"/>
-          </a:xfrm>
-          <a:prstGeom prst="flowChartDecision">
-            <a:avLst/>
-          </a:prstGeom>
-        </p:spPr>
-        <p:style>
-          <a:lnRef idx="2">
-            <a:schemeClr val="accent1">
-              <a:shade val="50000"/>
-            </a:schemeClr>
-          </a:lnRef>
-          <a:fillRef idx="1">
-            <a:schemeClr val="accent1"/>
-          </a:fillRef>
-          <a:effectRef idx="0">
-            <a:schemeClr val="accent1"/>
-          </a:effectRef>
-          <a:fontRef idx="minor">
-            <a:schemeClr val="lt1"/>
-          </a:fontRef>
-        </p:style>
-        <p:txBody>
-          <a:bodyPr rtlCol="0" anchor="ctr"/>
-          <a:lstStyle/>
-          <a:p>
-            <a:pPr algn="ctr"/>
-            <a:r>
-              <a:rPr lang="it-IT" dirty="0" smtClean="0"/>
-              <a:t>Use?</a:t>
-            </a:r>
-            <a:endParaRPr lang="it-IT" dirty="0"/>
-          </a:p>
-        </p:txBody>
-      </p:sp>
       <p:cxnSp>
         <p:nvCxnSpPr>
           <p:cNvPr id="19" name="Elbow Connector 18"/>
@@ -3343,35 +3299,6 @@
       </p:cxnSp>
       <p:sp>
         <p:nvSpPr>
-          <p:cNvPr id="23" name="TextBox 22"/>
-          <p:cNvSpPr txBox="1"/>
-          <p:nvPr/>
-        </p:nvSpPr>
-        <p:spPr>
-          <a:xfrm>
-            <a:off x="1331640" y="1868759"/>
-            <a:ext cx="718466" cy="369332"/>
-          </a:xfrm>
-          <a:prstGeom prst="rect">
-            <a:avLst/>
-          </a:prstGeom>
-          <a:noFill/>
-        </p:spPr>
-        <p:txBody>
-          <a:bodyPr wrap="none" rtlCol="0">
-            <a:spAutoFit/>
-          </a:bodyPr>
-          <a:lstStyle/>
-          <a:p>
-            <a:r>
-              <a:rPr lang="it-IT" dirty="0" smtClean="0"/>
-              <a:t>Abort</a:t>
-            </a:r>
-          </a:p>
-        </p:txBody>
-      </p:sp>
-      <p:sp>
-        <p:nvSpPr>
           <p:cNvPr id="39" name="Flowchart: Process 38"/>
           <p:cNvSpPr/>
           <p:nvPr/>
@@ -3540,104 +3467,152 @@
           </a:fontRef>
         </p:style>
       </p:cxnSp>
-      <p:sp>
-        <p:nvSpPr>
-          <p:cNvPr id="46" name="TextBox 45"/>
-          <p:cNvSpPr txBox="1"/>
+      <p:grpSp>
+        <p:nvGrpSpPr>
+          <p:cNvPr id="18" name="Group 17"/>
+          <p:cNvGrpSpPr/>
           <p:nvPr/>
-        </p:nvSpPr>
-        <p:spPr>
+        </p:nvGrpSpPr>
+        <p:grpSpPr>
           <a:xfrm>
-            <a:off x="2997167" y="1821759"/>
-            <a:ext cx="455574" cy="369332"/>
-          </a:xfrm>
-          <a:prstGeom prst="rect">
-            <a:avLst/>
-          </a:prstGeom>
-          <a:noFill/>
-        </p:spPr>
-        <p:txBody>
-          <a:bodyPr wrap="none" rtlCol="0">
-            <a:spAutoFit/>
-          </a:bodyPr>
-          <a:lstStyle/>
-          <a:p>
-            <a:r>
-              <a:rPr lang="it-IT" dirty="0" smtClean="0"/>
-              <a:t>No</a:t>
-            </a:r>
-          </a:p>
-        </p:txBody>
-      </p:sp>
-      <p:sp>
-        <p:nvSpPr>
-          <p:cNvPr id="47" name="TextBox 46"/>
-          <p:cNvSpPr txBox="1"/>
-          <p:nvPr/>
-        </p:nvSpPr>
-        <p:spPr>
-          <a:xfrm>
-            <a:off x="2031119" y="2551131"/>
-            <a:ext cx="485518" cy="369332"/>
-          </a:xfrm>
-          <a:prstGeom prst="rect">
-            <a:avLst/>
-          </a:prstGeom>
-          <a:noFill/>
-        </p:spPr>
-        <p:txBody>
-          <a:bodyPr wrap="none" rtlCol="0">
-            <a:spAutoFit/>
-          </a:bodyPr>
-          <a:lstStyle/>
-          <a:p>
-            <a:r>
-              <a:rPr lang="it-IT" dirty="0" smtClean="0"/>
-              <a:t>Yes</a:t>
-            </a:r>
-          </a:p>
-        </p:txBody>
-      </p:sp>
-      <p:sp>
-        <p:nvSpPr>
-          <p:cNvPr id="50" name="Flowchart: Decision 49"/>
-          <p:cNvSpPr/>
-          <p:nvPr/>
-        </p:nvSpPr>
-        <p:spPr>
-          <a:xfrm>
-            <a:off x="6372200" y="692696"/>
-            <a:ext cx="1005840" cy="631212"/>
-          </a:xfrm>
-          <a:prstGeom prst="flowChartDecision">
-            <a:avLst/>
-          </a:prstGeom>
-        </p:spPr>
-        <p:style>
-          <a:lnRef idx="2">
-            <a:schemeClr val="accent1">
-              <a:shade val="50000"/>
-            </a:schemeClr>
-          </a:lnRef>
-          <a:fillRef idx="1">
-            <a:schemeClr val="accent1"/>
-          </a:fillRef>
-          <a:effectRef idx="0">
-            <a:schemeClr val="accent1"/>
-          </a:effectRef>
-          <a:fontRef idx="minor">
-            <a:schemeClr val="lt1"/>
-          </a:fontRef>
-        </p:style>
-        <p:txBody>
-          <a:bodyPr rtlCol="0" anchor="ctr"/>
-          <a:lstStyle/>
-          <a:p>
-            <a:pPr algn="ctr"/>
-            <a:endParaRPr lang="it-IT" dirty="0"/>
-          </a:p>
-        </p:txBody>
-      </p:sp>
+            <a:off x="1331640" y="1821759"/>
+            <a:ext cx="2121101" cy="1098704"/>
+            <a:chOff x="1331640" y="1821759"/>
+            <a:chExt cx="2121101" cy="1098704"/>
+          </a:xfrm>
+        </p:grpSpPr>
+        <p:sp>
+          <p:nvSpPr>
+            <p:cNvPr id="17" name="Flowchart: Decision 16"/>
+            <p:cNvSpPr/>
+            <p:nvPr/>
+          </p:nvSpPr>
+          <p:spPr>
+            <a:xfrm>
+              <a:off x="1847251" y="1871499"/>
+              <a:ext cx="1338773" cy="694333"/>
+            </a:xfrm>
+            <a:prstGeom prst="flowChartDecision">
+              <a:avLst/>
+            </a:prstGeom>
+          </p:spPr>
+          <p:style>
+            <a:lnRef idx="2">
+              <a:schemeClr val="accent1">
+                <a:shade val="50000"/>
+              </a:schemeClr>
+            </a:lnRef>
+            <a:fillRef idx="1">
+              <a:schemeClr val="accent1"/>
+            </a:fillRef>
+            <a:effectRef idx="0">
+              <a:schemeClr val="accent1"/>
+            </a:effectRef>
+            <a:fontRef idx="minor">
+              <a:schemeClr val="lt1"/>
+            </a:fontRef>
+          </p:style>
+          <p:txBody>
+            <a:bodyPr rtlCol="0" anchor="ctr"/>
+            <a:lstStyle/>
+            <a:p>
+              <a:pPr algn="ctr"/>
+              <a:r>
+                <a:rPr lang="it-IT" dirty="0" smtClean="0"/>
+                <a:t>Use?</a:t>
+              </a:r>
+              <a:endParaRPr lang="it-IT" dirty="0"/>
+            </a:p>
+          </p:txBody>
+        </p:sp>
+        <p:sp>
+          <p:nvSpPr>
+            <p:cNvPr id="23" name="TextBox 22"/>
+            <p:cNvSpPr txBox="1"/>
+            <p:nvPr/>
+          </p:nvSpPr>
+          <p:spPr>
+            <a:xfrm>
+              <a:off x="1331640" y="1868759"/>
+              <a:ext cx="718466" cy="369332"/>
+            </a:xfrm>
+            <a:prstGeom prst="rect">
+              <a:avLst/>
+            </a:prstGeom>
+            <a:noFill/>
+          </p:spPr>
+          <p:txBody>
+            <a:bodyPr wrap="none" rtlCol="0">
+              <a:spAutoFit/>
+            </a:bodyPr>
+            <a:lstStyle/>
+            <a:p>
+              <a:r>
+                <a:rPr lang="it-IT" dirty="0" smtClean="0"/>
+                <a:t>Abort</a:t>
+              </a:r>
+            </a:p>
+          </p:txBody>
+        </p:sp>
+        <p:sp>
+          <p:nvSpPr>
+            <p:cNvPr id="46" name="TextBox 45"/>
+            <p:cNvSpPr txBox="1"/>
+            <p:nvPr/>
+          </p:nvSpPr>
+          <p:spPr>
+            <a:xfrm>
+              <a:off x="2997167" y="1821759"/>
+              <a:ext cx="455574" cy="369332"/>
+            </a:xfrm>
+            <a:prstGeom prst="rect">
+              <a:avLst/>
+            </a:prstGeom>
+            <a:noFill/>
+          </p:spPr>
+          <p:txBody>
+            <a:bodyPr wrap="none" rtlCol="0">
+              <a:spAutoFit/>
+            </a:bodyPr>
+            <a:lstStyle/>
+            <a:p>
+              <a:r>
+                <a:rPr lang="it-IT" dirty="0" smtClean="0"/>
+                <a:t>No</a:t>
+              </a:r>
+            </a:p>
+          </p:txBody>
+        </p:sp>
+        <p:sp>
+          <p:nvSpPr>
+            <p:cNvPr id="47" name="TextBox 46"/>
+            <p:cNvSpPr txBox="1"/>
+            <p:nvPr/>
+          </p:nvSpPr>
+          <p:spPr>
+            <a:xfrm>
+              <a:off x="2031119" y="2551131"/>
+              <a:ext cx="485518" cy="369332"/>
+            </a:xfrm>
+            <a:prstGeom prst="rect">
+              <a:avLst/>
+            </a:prstGeom>
+            <a:noFill/>
+          </p:spPr>
+          <p:txBody>
+            <a:bodyPr wrap="none" rtlCol="0">
+              <a:spAutoFit/>
+            </a:bodyPr>
+            <a:lstStyle/>
+            <a:p>
+              <a:r>
+                <a:rPr lang="it-IT" dirty="0" smtClean="0"/>
+                <a:t>Yes</a:t>
+              </a:r>
+            </a:p>
+          </p:txBody>
+        </p:sp>
+      </p:grpSp>
       <p:cxnSp>
         <p:nvCxnSpPr>
           <p:cNvPr id="52" name="Elbow Connector 51"/>
@@ -3715,64 +3690,119 @@
           </a:fontRef>
         </p:style>
       </p:cxnSp>
-      <p:sp>
-        <p:nvSpPr>
-          <p:cNvPr id="55" name="TextBox 54"/>
-          <p:cNvSpPr txBox="1"/>
+      <p:grpSp>
+        <p:nvGrpSpPr>
+          <p:cNvPr id="20" name="Group 19"/>
+          <p:cNvGrpSpPr/>
           <p:nvPr/>
-        </p:nvSpPr>
-        <p:spPr>
+        </p:nvGrpSpPr>
+        <p:grpSpPr>
           <a:xfrm>
-            <a:off x="6933721" y="395372"/>
-            <a:ext cx="806631" cy="369332"/>
-          </a:xfrm>
-          <a:prstGeom prst="rect">
-            <a:avLst/>
-          </a:prstGeom>
-          <a:noFill/>
-        </p:spPr>
-        <p:txBody>
-          <a:bodyPr wrap="none" rtlCol="0">
-            <a:spAutoFit/>
-          </a:bodyPr>
-          <a:lstStyle/>
-          <a:p>
-            <a:r>
-              <a:rPr lang="it-IT" dirty="0" smtClean="0"/>
-              <a:t>Cancel</a:t>
-            </a:r>
-          </a:p>
-        </p:txBody>
-      </p:sp>
-      <p:sp>
-        <p:nvSpPr>
-          <p:cNvPr id="56" name="TextBox 55"/>
-          <p:cNvSpPr txBox="1"/>
-          <p:nvPr/>
-        </p:nvSpPr>
-        <p:spPr>
-          <a:xfrm>
-            <a:off x="7011174" y="1196752"/>
-            <a:ext cx="441146" cy="369332"/>
-          </a:xfrm>
-          <a:prstGeom prst="rect">
-            <a:avLst/>
-          </a:prstGeom>
-          <a:noFill/>
-        </p:spPr>
-        <p:txBody>
-          <a:bodyPr wrap="none" rtlCol="0">
-            <a:spAutoFit/>
-          </a:bodyPr>
-          <a:lstStyle/>
-          <a:p>
-            <a:r>
-              <a:rPr lang="it-IT" dirty="0" smtClean="0"/>
-              <a:t>Ok</a:t>
-            </a:r>
-          </a:p>
-        </p:txBody>
-      </p:sp>
+            <a:off x="6372200" y="395372"/>
+            <a:ext cx="1368152" cy="1170712"/>
+            <a:chOff x="6372200" y="395372"/>
+            <a:chExt cx="1368152" cy="1170712"/>
+          </a:xfrm>
+        </p:grpSpPr>
+        <p:sp>
+          <p:nvSpPr>
+            <p:cNvPr id="50" name="Flowchart: Decision 49"/>
+            <p:cNvSpPr/>
+            <p:nvPr/>
+          </p:nvSpPr>
+          <p:spPr>
+            <a:xfrm>
+              <a:off x="6372200" y="692696"/>
+              <a:ext cx="1005840" cy="631212"/>
+            </a:xfrm>
+            <a:prstGeom prst="flowChartDecision">
+              <a:avLst/>
+            </a:prstGeom>
+          </p:spPr>
+          <p:style>
+            <a:lnRef idx="2">
+              <a:schemeClr val="accent1">
+                <a:shade val="50000"/>
+              </a:schemeClr>
+            </a:lnRef>
+            <a:fillRef idx="1">
+              <a:schemeClr val="accent1"/>
+            </a:fillRef>
+            <a:effectRef idx="0">
+              <a:schemeClr val="accent1"/>
+            </a:effectRef>
+            <a:fontRef idx="minor">
+              <a:schemeClr val="lt1"/>
+            </a:fontRef>
+          </p:style>
+          <p:txBody>
+            <a:bodyPr rtlCol="0" anchor="ctr"/>
+            <a:lstStyle/>
+            <a:p>
+              <a:pPr algn="ctr"/>
+              <a:endParaRPr lang="it-IT" dirty="0"/>
+            </a:p>
+          </p:txBody>
+        </p:sp>
+        <p:sp>
+          <p:nvSpPr>
+            <p:cNvPr id="55" name="TextBox 54"/>
+            <p:cNvSpPr txBox="1"/>
+            <p:nvPr/>
+          </p:nvSpPr>
+          <p:spPr>
+            <a:xfrm>
+              <a:off x="6933721" y="395372"/>
+              <a:ext cx="806631" cy="369332"/>
+            </a:xfrm>
+            <a:prstGeom prst="rect">
+              <a:avLst/>
+            </a:prstGeom>
+            <a:noFill/>
+          </p:spPr>
+          <p:txBody>
+            <a:bodyPr wrap="none" rtlCol="0">
+              <a:spAutoFit/>
+            </a:bodyPr>
+            <a:lstStyle/>
+            <a:p>
+              <a:r>
+                <a:rPr lang="it-IT" dirty="0" smtClean="0"/>
+                <a:t>Cancel</a:t>
+              </a:r>
+            </a:p>
+          </p:txBody>
+        </p:sp>
+        <p:sp>
+          <p:nvSpPr>
+            <p:cNvPr id="56" name="TextBox 55"/>
+            <p:cNvSpPr txBox="1"/>
+            <p:nvPr/>
+          </p:nvSpPr>
+          <p:spPr>
+            <a:xfrm>
+              <a:off x="7011174" y="1196752"/>
+              <a:ext cx="441146" cy="369332"/>
+            </a:xfrm>
+            <a:prstGeom prst="rect">
+              <a:avLst/>
+            </a:prstGeom>
+            <a:noFill/>
+          </p:spPr>
+          <p:txBody>
+            <a:bodyPr wrap="none" rtlCol="0">
+              <a:spAutoFit/>
+            </a:bodyPr>
+            <a:lstStyle/>
+            <a:p>
+              <a:r>
+                <a:rPr lang="it-IT" dirty="0" smtClean="0"/>
+                <a:t>Ok</a:t>
+              </a:r>
+            </a:p>
+          </p:txBody>
+        </p:sp>
+      </p:grpSp>
       <p:sp>
         <p:nvSpPr>
           <p:cNvPr id="57" name="Flowchart: Process 56"/>
@@ -3857,46 +3887,6 @@
           </a:fontRef>
         </p:style>
       </p:cxnSp>
-      <p:sp>
-        <p:nvSpPr>
-          <p:cNvPr id="65" name="Flowchart: Decision 64"/>
-          <p:cNvSpPr/>
-          <p:nvPr/>
-        </p:nvSpPr>
-        <p:spPr>
-          <a:xfrm>
-            <a:off x="1475656" y="4381964"/>
-            <a:ext cx="1005840" cy="631212"/>
-          </a:xfrm>
-          <a:prstGeom prst="flowChartDecision">
-            <a:avLst/>
-          </a:prstGeom>
-        </p:spPr>
-        <p:style>
-          <a:lnRef idx="2">
-            <a:schemeClr val="accent1">
-              <a:shade val="50000"/>
-            </a:schemeClr>
-          </a:lnRef>
-          <a:fillRef idx="1">
-            <a:schemeClr val="accent1"/>
-          </a:fillRef>
-          <a:effectRef idx="0">
-            <a:schemeClr val="accent1"/>
-          </a:effectRef>
-          <a:fontRef idx="minor">
-            <a:schemeClr val="lt1"/>
-          </a:fontRef>
-        </p:style>
-        <p:txBody>
-          <a:bodyPr rtlCol="0" anchor="ctr"/>
-          <a:lstStyle/>
-          <a:p>
-            <a:pPr algn="ctr"/>
-            <a:endParaRPr lang="it-IT" dirty="0"/>
-          </a:p>
-        </p:txBody>
-      </p:sp>
       <p:cxnSp>
         <p:nvCxnSpPr>
           <p:cNvPr id="67" name="Elbow Connector 66"/>
@@ -3980,64 +3970,6 @@
       </p:cxnSp>
       <p:sp>
         <p:nvSpPr>
-          <p:cNvPr id="73" name="TextBox 72"/>
-          <p:cNvSpPr txBox="1"/>
-          <p:nvPr/>
-        </p:nvSpPr>
-        <p:spPr>
-          <a:xfrm>
-            <a:off x="1979712" y="5003884"/>
-            <a:ext cx="441146" cy="369332"/>
-          </a:xfrm>
-          <a:prstGeom prst="rect">
-            <a:avLst/>
-          </a:prstGeom>
-          <a:noFill/>
-        </p:spPr>
-        <p:txBody>
-          <a:bodyPr wrap="none" rtlCol="0">
-            <a:spAutoFit/>
-          </a:bodyPr>
-          <a:lstStyle/>
-          <a:p>
-            <a:r>
-              <a:rPr lang="it-IT" dirty="0" smtClean="0"/>
-              <a:t>Ok</a:t>
-            </a:r>
-          </a:p>
-        </p:txBody>
-      </p:sp>
-      <p:sp>
-        <p:nvSpPr>
-          <p:cNvPr id="74" name="TextBox 73"/>
-          <p:cNvSpPr txBox="1"/>
-          <p:nvPr/>
-        </p:nvSpPr>
-        <p:spPr>
-          <a:xfrm>
-            <a:off x="6173418" y="5014515"/>
-            <a:ext cx="500650" cy="369332"/>
-          </a:xfrm>
-          <a:prstGeom prst="rect">
-            <a:avLst/>
-          </a:prstGeom>
-          <a:noFill/>
-        </p:spPr>
-        <p:txBody>
-          <a:bodyPr wrap="none" rtlCol="0">
-            <a:spAutoFit/>
-          </a:bodyPr>
-          <a:lstStyle/>
-          <a:p>
-            <a:r>
-              <a:rPr lang="it-IT" dirty="0" smtClean="0"/>
-              <a:t>Fail</a:t>
-            </a:r>
-          </a:p>
-        </p:txBody>
-      </p:sp>
-      <p:sp>
-        <p:nvSpPr>
           <p:cNvPr id="76" name="Flowchart: Process 75"/>
           <p:cNvSpPr/>
           <p:nvPr/>
@@ -4121,59 +4053,19 @@
           </a:fontRef>
         </p:style>
       </p:cxnSp>
-      <p:sp>
-        <p:nvSpPr>
-          <p:cNvPr id="80" name="Flowchart: Decision 79"/>
-          <p:cNvSpPr/>
-          <p:nvPr/>
-        </p:nvSpPr>
-        <p:spPr>
-          <a:xfrm>
-            <a:off x="6225907" y="5496457"/>
-            <a:ext cx="1005840" cy="631212"/>
-          </a:xfrm>
-          <a:prstGeom prst="flowChartDecision">
-            <a:avLst/>
-          </a:prstGeom>
-        </p:spPr>
-        <p:style>
-          <a:lnRef idx="2">
-            <a:schemeClr val="accent1">
-              <a:shade val="50000"/>
-            </a:schemeClr>
-          </a:lnRef>
-          <a:fillRef idx="1">
-            <a:schemeClr val="accent1"/>
-          </a:fillRef>
-          <a:effectRef idx="0">
-            <a:schemeClr val="accent1"/>
-          </a:effectRef>
-          <a:fontRef idx="minor">
-            <a:schemeClr val="lt1"/>
-          </a:fontRef>
-        </p:style>
-        <p:txBody>
-          <a:bodyPr rtlCol="0" anchor="ctr"/>
-          <a:lstStyle/>
-          <a:p>
-            <a:pPr algn="ctr"/>
-            <a:endParaRPr lang="it-IT" dirty="0"/>
-          </a:p>
-        </p:txBody>
-      </p:sp>
       <p:cxnSp>
         <p:nvCxnSpPr>
           <p:cNvPr id="81" name="Elbow Connector 80"/>
           <p:cNvCxnSpPr>
-            <a:stCxn id="76" idx="3"/>
-            <a:endCxn id="80" idx="1"/>
+            <a:stCxn id="76" idx="0"/>
+            <a:endCxn id="80" idx="2"/>
           </p:cNvCxnSpPr>
           <p:nvPr/>
         </p:nvCxnSpPr>
         <p:spPr>
-          <a:xfrm flipV="1">
-            <a:off x="5452079" y="5812063"/>
-            <a:ext cx="773828" cy="1"/>
+          <a:xfrm rot="5400000" flipH="1" flipV="1">
+            <a:off x="4905201" y="5230354"/>
+            <a:ext cx="505832" cy="265654"/>
           </a:xfrm>
           <a:prstGeom prst="bentConnector3">
             <a:avLst>
@@ -4202,50 +4094,137 @@
           </a:fontRef>
         </p:style>
       </p:cxnSp>
-      <p:sp>
-        <p:nvSpPr>
-          <p:cNvPr id="84" name="TextBox 83"/>
-          <p:cNvSpPr txBox="1"/>
+      <p:grpSp>
+        <p:nvGrpSpPr>
+          <p:cNvPr id="24" name="Group 23"/>
+          <p:cNvGrpSpPr/>
           <p:nvPr/>
-        </p:nvSpPr>
-        <p:spPr>
+        </p:nvGrpSpPr>
+        <p:grpSpPr>
           <a:xfrm>
-            <a:off x="7157467" y="5999426"/>
-            <a:ext cx="441146" cy="369332"/>
-          </a:xfrm>
-          <a:prstGeom prst="rect">
-            <a:avLst/>
-          </a:prstGeom>
-          <a:noFill/>
-        </p:spPr>
-        <p:txBody>
-          <a:bodyPr wrap="none" rtlCol="0">
-            <a:spAutoFit/>
-          </a:bodyPr>
-          <a:lstStyle/>
-          <a:p>
-            <a:r>
-              <a:rPr lang="it-IT" dirty="0" smtClean="0"/>
-              <a:t>Ok</a:t>
-            </a:r>
-          </a:p>
-        </p:txBody>
-      </p:sp>
+            <a:off x="4788024" y="4202504"/>
+            <a:ext cx="1440160" cy="954688"/>
+            <a:chOff x="6225907" y="5219908"/>
+            <a:chExt cx="1440160" cy="954688"/>
+          </a:xfrm>
+        </p:grpSpPr>
+        <p:sp>
+          <p:nvSpPr>
+            <p:cNvPr id="74" name="TextBox 73"/>
+            <p:cNvSpPr txBox="1"/>
+            <p:nvPr/>
+          </p:nvSpPr>
+          <p:spPr>
+            <a:xfrm>
+              <a:off x="7165417" y="5805264"/>
+              <a:ext cx="500650" cy="369332"/>
+            </a:xfrm>
+            <a:prstGeom prst="rect">
+              <a:avLst/>
+            </a:prstGeom>
+            <a:noFill/>
+          </p:spPr>
+          <p:txBody>
+            <a:bodyPr wrap="none" rtlCol="0">
+              <a:spAutoFit/>
+            </a:bodyPr>
+            <a:lstStyle/>
+            <a:p>
+              <a:r>
+                <a:rPr lang="it-IT" dirty="0" smtClean="0"/>
+                <a:t>Fail</a:t>
+              </a:r>
+            </a:p>
+          </p:txBody>
+        </p:sp>
+        <p:sp>
+          <p:nvSpPr>
+            <p:cNvPr id="80" name="Flowchart: Decision 79"/>
+            <p:cNvSpPr/>
+            <p:nvPr/>
+          </p:nvSpPr>
+          <p:spPr>
+            <a:xfrm>
+              <a:off x="6225907" y="5496457"/>
+              <a:ext cx="1005840" cy="631212"/>
+            </a:xfrm>
+            <a:prstGeom prst="flowChartDecision">
+              <a:avLst/>
+            </a:prstGeom>
+          </p:spPr>
+          <p:style>
+            <a:lnRef idx="2">
+              <a:schemeClr val="accent1">
+                <a:shade val="50000"/>
+              </a:schemeClr>
+            </a:lnRef>
+            <a:fillRef idx="1">
+              <a:schemeClr val="accent1"/>
+            </a:fillRef>
+            <a:effectRef idx="0">
+              <a:schemeClr val="accent1"/>
+            </a:effectRef>
+            <a:fontRef idx="minor">
+              <a:schemeClr val="lt1"/>
+            </a:fontRef>
+          </p:style>
+          <p:txBody>
+            <a:bodyPr rtlCol="0" anchor="ctr"/>
+            <a:lstStyle/>
+            <a:p>
+              <a:pPr algn="ctr"/>
+              <a:endParaRPr lang="it-IT" dirty="0"/>
+            </a:p>
+          </p:txBody>
+        </p:sp>
+        <p:sp>
+          <p:nvSpPr>
+            <p:cNvPr id="84" name="TextBox 83"/>
+            <p:cNvSpPr txBox="1"/>
+            <p:nvPr/>
+          </p:nvSpPr>
+          <p:spPr>
+            <a:xfrm>
+              <a:off x="6291094" y="5219908"/>
+              <a:ext cx="441146" cy="369332"/>
+            </a:xfrm>
+            <a:prstGeom prst="rect">
+              <a:avLst/>
+            </a:prstGeom>
+            <a:noFill/>
+          </p:spPr>
+          <p:txBody>
+            <a:bodyPr wrap="none" rtlCol="0">
+              <a:spAutoFit/>
+            </a:bodyPr>
+            <a:lstStyle/>
+            <a:p>
+              <a:r>
+                <a:rPr lang="it-IT" dirty="0" smtClean="0"/>
+                <a:t>Ok</a:t>
+              </a:r>
+            </a:p>
+          </p:txBody>
+        </p:sp>
+      </p:grpSp>
       <p:cxnSp>
         <p:nvCxnSpPr>
           <p:cNvPr id="85" name="Elbow Connector 84"/>
           <p:cNvCxnSpPr>
             <a:stCxn id="80" idx="0"/>
+            <a:endCxn id="4" idx="2"/>
           </p:cNvCxnSpPr>
           <p:nvPr/>
         </p:nvCxnSpPr>
         <p:spPr>
-          <a:xfrm rot="5400000" flipH="1" flipV="1">
-            <a:off x="6749351" y="4361441"/>
-            <a:ext cx="1114492" cy="1155541"/>
-          </a:xfrm>
-          <a:prstGeom prst="bentConnector2">
-            <a:avLst/>
+          <a:xfrm rot="16200000" flipV="1">
+            <a:off x="4045373" y="3233482"/>
+            <a:ext cx="2202181" cy="288962"/>
+          </a:xfrm>
+          <a:prstGeom prst="bentConnector3">
+            <a:avLst>
+              <a:gd name="adj1" fmla="val 50000"/>
+            </a:avLst>
           </a:prstGeom>
           <a:ln w="28575">
             <a:solidFill>
@@ -4279,7 +4258,7 @@
         </p:nvCxnSpPr>
         <p:spPr>
           <a:xfrm>
-            <a:off x="7231747" y="5812063"/>
+            <a:off x="5793864" y="4794659"/>
             <a:ext cx="1228685" cy="12700"/>
           </a:xfrm>
           <a:prstGeom prst="bentConnector3">
@@ -4309,32 +4288,367 @@
           </a:fontRef>
         </p:style>
       </p:cxnSp>
-      <p:sp>
-        <p:nvSpPr>
-          <p:cNvPr id="93" name="TextBox 92"/>
-          <p:cNvSpPr txBox="1"/>
+      <p:grpSp>
+        <p:nvGrpSpPr>
+          <p:cNvPr id="22" name="Group 21"/>
+          <p:cNvGrpSpPr/>
+          <p:nvPr/>
+        </p:nvGrpSpPr>
+        <p:grpSpPr>
+          <a:xfrm>
+            <a:off x="1475656" y="4221088"/>
+            <a:ext cx="1368152" cy="1152128"/>
+            <a:chOff x="1475656" y="4221088"/>
+            <a:chExt cx="1368152" cy="1152128"/>
+          </a:xfrm>
+        </p:grpSpPr>
+        <p:sp>
+          <p:nvSpPr>
+            <p:cNvPr id="65" name="Flowchart: Decision 64"/>
+            <p:cNvSpPr/>
+            <p:nvPr/>
+          </p:nvSpPr>
+          <p:spPr>
+            <a:xfrm>
+              <a:off x="1475656" y="4381964"/>
+              <a:ext cx="1005840" cy="631212"/>
+            </a:xfrm>
+            <a:prstGeom prst="flowChartDecision">
+              <a:avLst/>
+            </a:prstGeom>
+          </p:spPr>
+          <p:style>
+            <a:lnRef idx="2">
+              <a:schemeClr val="accent1">
+                <a:shade val="50000"/>
+              </a:schemeClr>
+            </a:lnRef>
+            <a:fillRef idx="1">
+              <a:schemeClr val="accent1"/>
+            </a:fillRef>
+            <a:effectRef idx="0">
+              <a:schemeClr val="accent1"/>
+            </a:effectRef>
+            <a:fontRef idx="minor">
+              <a:schemeClr val="lt1"/>
+            </a:fontRef>
+          </p:style>
+          <p:txBody>
+            <a:bodyPr rtlCol="0" anchor="ctr"/>
+            <a:lstStyle/>
+            <a:p>
+              <a:pPr algn="ctr"/>
+              <a:endParaRPr lang="it-IT" dirty="0"/>
+            </a:p>
+          </p:txBody>
+        </p:sp>
+        <p:sp>
+          <p:nvSpPr>
+            <p:cNvPr id="73" name="TextBox 72"/>
+            <p:cNvSpPr txBox="1"/>
+            <p:nvPr/>
+          </p:nvSpPr>
+          <p:spPr>
+            <a:xfrm>
+              <a:off x="1979712" y="5003884"/>
+              <a:ext cx="441146" cy="369332"/>
+            </a:xfrm>
+            <a:prstGeom prst="rect">
+              <a:avLst/>
+            </a:prstGeom>
+            <a:noFill/>
+          </p:spPr>
+          <p:txBody>
+            <a:bodyPr wrap="none" rtlCol="0">
+              <a:spAutoFit/>
+            </a:bodyPr>
+            <a:lstStyle/>
+            <a:p>
+              <a:r>
+                <a:rPr lang="it-IT" dirty="0" smtClean="0"/>
+                <a:t>Ok</a:t>
+              </a:r>
+            </a:p>
+          </p:txBody>
+        </p:sp>
+        <p:sp>
+          <p:nvSpPr>
+            <p:cNvPr id="93" name="TextBox 92"/>
+            <p:cNvSpPr txBox="1"/>
+            <p:nvPr/>
+          </p:nvSpPr>
+          <p:spPr>
+            <a:xfrm>
+              <a:off x="2343158" y="4221088"/>
+              <a:ext cx="500650" cy="369332"/>
+            </a:xfrm>
+            <a:prstGeom prst="rect">
+              <a:avLst/>
+            </a:prstGeom>
+            <a:noFill/>
+          </p:spPr>
+          <p:txBody>
+            <a:bodyPr wrap="none" rtlCol="0">
+              <a:spAutoFit/>
+            </a:bodyPr>
+            <a:lstStyle/>
+            <a:p>
+              <a:r>
+                <a:rPr lang="it-IT" dirty="0" smtClean="0"/>
+                <a:t>Fail</a:t>
+              </a:r>
+            </a:p>
+          </p:txBody>
+        </p:sp>
+      </p:grpSp>
+      <p:cxnSp>
+        <p:nvCxnSpPr>
+          <p:cNvPr id="3" name="Elbow Connector 2"/>
+          <p:cNvCxnSpPr>
+            <a:stCxn id="50" idx="2"/>
+            <a:endCxn id="4" idx="0"/>
+          </p:cNvCxnSpPr>
+          <p:nvPr/>
+        </p:nvCxnSpPr>
+        <p:spPr>
+          <a:xfrm rot="5400000">
+            <a:off x="5671293" y="654597"/>
+            <a:ext cx="534517" cy="1873138"/>
+          </a:xfrm>
+          <a:prstGeom prst="bentConnector3">
+            <a:avLst/>
+          </a:prstGeom>
+          <a:ln w="28575">
+            <a:solidFill>
+              <a:srgbClr val="92D050"/>
+            </a:solidFill>
+            <a:tailEnd type="arrow"/>
+          </a:ln>
+        </p:spPr>
+        <p:style>
+          <a:lnRef idx="1">
+            <a:schemeClr val="accent1"/>
+          </a:lnRef>
+          <a:fillRef idx="0">
+            <a:schemeClr val="accent1"/>
+          </a:fillRef>
+          <a:effectRef idx="0">
+            <a:schemeClr val="accent1"/>
+          </a:effectRef>
+          <a:fontRef idx="minor">
+            <a:schemeClr val="tx1"/>
+          </a:fontRef>
+        </p:style>
+      </p:cxnSp>
+      <p:sp>
+        <p:nvSpPr>
+          <p:cNvPr id="4" name="Flowchart: Process 3"/>
+          <p:cNvSpPr/>
           <p:nvPr/>
         </p:nvSpPr>
         <p:spPr>
           <a:xfrm>
-            <a:off x="2343158" y="4221088"/>
-            <a:ext cx="500650" cy="369332"/>
-          </a:xfrm>
-          <a:prstGeom prst="rect">
+            <a:off x="3923928" y="1858425"/>
+            <a:ext cx="2156108" cy="418447"/>
+          </a:xfrm>
+          <a:prstGeom prst="flowChartProcess">
             <a:avLst/>
           </a:prstGeom>
-          <a:noFill/>
         </p:spPr>
-        <p:txBody>
-          <a:bodyPr wrap="none" rtlCol="0">
-            <a:spAutoFit/>
-          </a:bodyPr>
-          <a:lstStyle/>
-          <a:p>
+        <p:style>
+          <a:lnRef idx="2">
+            <a:schemeClr val="accent1">
+              <a:shade val="50000"/>
+            </a:schemeClr>
+          </a:lnRef>
+          <a:fillRef idx="1">
+            <a:schemeClr val="accent1"/>
+          </a:fillRef>
+          <a:effectRef idx="0">
+            <a:schemeClr val="accent1"/>
+          </a:effectRef>
+          <a:fontRef idx="minor">
+            <a:schemeClr val="lt1"/>
+          </a:fontRef>
+        </p:style>
+        <p:txBody>
+          <a:bodyPr rtlCol="0" anchor="ctr"/>
+          <a:lstStyle/>
+          <a:p>
+            <a:pPr algn="ctr"/>
+            <a:r>
+              <a:rPr lang="it-IT" dirty="0"/>
+              <a:t>GazzettaFileReader</a:t>
+            </a:r>
+            <a:endParaRPr lang="it-IT" dirty="0"/>
+          </a:p>
+        </p:txBody>
+      </p:sp>
+      <p:cxnSp>
+        <p:nvCxnSpPr>
+          <p:cNvPr id="41" name="Elbow Connector 40"/>
+          <p:cNvCxnSpPr>
+            <a:stCxn id="4" idx="3"/>
+            <a:endCxn id="48" idx="1"/>
+          </p:cNvCxnSpPr>
+          <p:nvPr/>
+        </p:nvCxnSpPr>
+        <p:spPr>
+          <a:xfrm flipV="1">
+            <a:off x="6080036" y="2061314"/>
+            <a:ext cx="334031" cy="6335"/>
+          </a:xfrm>
+          <a:prstGeom prst="bentConnector3">
+            <a:avLst>
+              <a:gd name="adj1" fmla="val 50000"/>
+            </a:avLst>
+          </a:prstGeom>
+          <a:ln w="28575">
+            <a:solidFill>
+              <a:srgbClr val="92D050"/>
+            </a:solidFill>
+            <a:tailEnd type="arrow"/>
+          </a:ln>
+        </p:spPr>
+        <p:style>
+          <a:lnRef idx="1">
+            <a:schemeClr val="accent1"/>
+          </a:lnRef>
+          <a:fillRef idx="0">
+            <a:schemeClr val="accent1"/>
+          </a:fillRef>
+          <a:effectRef idx="0">
+            <a:schemeClr val="accent1"/>
+          </a:effectRef>
+          <a:fontRef idx="minor">
+            <a:schemeClr val="tx1"/>
+          </a:fontRef>
+        </p:style>
+      </p:cxnSp>
+      <p:sp>
+        <p:nvSpPr>
+          <p:cNvPr id="48" name="Flowchart: Process 47"/>
+          <p:cNvSpPr/>
+          <p:nvPr/>
+        </p:nvSpPr>
+        <p:spPr>
+          <a:xfrm>
+            <a:off x="6414067" y="1852090"/>
+            <a:ext cx="2371719" cy="418447"/>
+          </a:xfrm>
+          <a:prstGeom prst="flowChartProcess">
+            <a:avLst/>
+          </a:prstGeom>
+        </p:spPr>
+        <p:style>
+          <a:lnRef idx="2">
+            <a:schemeClr val="accent1">
+              <a:shade val="50000"/>
+            </a:schemeClr>
+          </a:lnRef>
+          <a:fillRef idx="1">
+            <a:schemeClr val="accent1"/>
+          </a:fillRef>
+          <a:effectRef idx="0">
+            <a:schemeClr val="accent1"/>
+          </a:effectRef>
+          <a:fontRef idx="minor">
+            <a:schemeClr val="lt1"/>
+          </a:fontRef>
+        </p:style>
+        <p:txBody>
+          <a:bodyPr rtlCol="0" anchor="ctr"/>
+          <a:lstStyle/>
+          <a:p>
+            <a:pPr algn="ctr"/>
             <a:r>
               <a:rPr lang="it-IT" dirty="0" smtClean="0"/>
-              <a:t>Fail</a:t>
-            </a:r>
+              <a:t>FormazioniFileReader</a:t>
+            </a:r>
+            <a:endParaRPr lang="it-IT" dirty="0"/>
+          </a:p>
+        </p:txBody>
+      </p:sp>
+      <p:cxnSp>
+        <p:nvCxnSpPr>
+          <p:cNvPr id="29" name="Elbow Connector 28"/>
+          <p:cNvCxnSpPr>
+            <a:stCxn id="48" idx="2"/>
+            <a:endCxn id="30" idx="0"/>
+          </p:cNvCxnSpPr>
+          <p:nvPr/>
+        </p:nvCxnSpPr>
+        <p:spPr>
+          <a:xfrm rot="5400000">
+            <a:off x="7040873" y="2365889"/>
+            <a:ext cx="654407" cy="463702"/>
+          </a:xfrm>
+          <a:prstGeom prst="bentConnector3">
+            <a:avLst/>
+          </a:prstGeom>
+          <a:ln w="28575">
+            <a:solidFill>
+              <a:srgbClr val="92D050"/>
+            </a:solidFill>
+            <a:tailEnd type="arrow"/>
+          </a:ln>
+        </p:spPr>
+        <p:style>
+          <a:lnRef idx="1">
+            <a:schemeClr val="accent1"/>
+          </a:lnRef>
+          <a:fillRef idx="0">
+            <a:schemeClr val="accent1"/>
+          </a:fillRef>
+          <a:effectRef idx="0">
+            <a:schemeClr val="accent1"/>
+          </a:effectRef>
+          <a:fontRef idx="minor">
+            <a:schemeClr val="tx1"/>
+          </a:fontRef>
+        </p:style>
+      </p:cxnSp>
+      <p:sp>
+        <p:nvSpPr>
+          <p:cNvPr id="30" name="Flowchart: Process 29"/>
+          <p:cNvSpPr/>
+          <p:nvPr/>
+        </p:nvSpPr>
+        <p:spPr>
+          <a:xfrm>
+            <a:off x="6156176" y="2924944"/>
+            <a:ext cx="1960098" cy="380406"/>
+          </a:xfrm>
+          <a:prstGeom prst="flowChartProcess">
+            <a:avLst/>
+          </a:prstGeom>
+        </p:spPr>
+        <p:style>
+          <a:lnRef idx="2">
+            <a:schemeClr val="accent1">
+              <a:shade val="50000"/>
+            </a:schemeClr>
+          </a:lnRef>
+          <a:fillRef idx="1">
+            <a:schemeClr val="accent1"/>
+          </a:fillRef>
+          <a:effectRef idx="0">
+            <a:schemeClr val="accent1"/>
+          </a:effectRef>
+          <a:fontRef idx="minor">
+            <a:schemeClr val="lt1"/>
+          </a:fontRef>
+        </p:style>
+        <p:txBody>
+          <a:bodyPr rtlCol="0" anchor="ctr"/>
+          <a:lstStyle/>
+          <a:p>
+            <a:pPr algn="ctr"/>
+            <a:r>
+              <a:rPr lang="it-IT" dirty="0"/>
+              <a:t>FANTA-&gt;execute();</a:t>
+            </a:r>
+            <a:endParaRPr lang="it-IT" dirty="0"/>
           </a:p>
         </p:txBody>
       </p:sp>

</xml_diff>

<commit_message>
ci capisco poco ...
</commit_message>
<xml_diff>
--- a/FlowDiagram.pptx
+++ b/FlowDiagram.pptx
@@ -6,6 +6,7 @@
   </p:sldMasterIdLst>
   <p:sldIdLst>
     <p:sldId id="256" r:id="rId2"/>
+    <p:sldId id="257" r:id="rId3"/>
   </p:sldIdLst>
   <p:sldSz cx="9144000" cy="6858000" type="screen4x3"/>
   <p:notesSz cx="6858000" cy="9144000"/>
@@ -288,7 +289,7 @@
           <a:p>
             <a:fld id="{AB513B0F-27F6-4823-A85B-BB3CFE0DE5B8}" type="datetimeFigureOut">
               <a:rPr lang="it-IT" smtClean="0"/>
-              <a:t>18/11/2011</a:t>
+              <a:t>20/11/2011</a:t>
             </a:fld>
             <a:endParaRPr lang="it-IT"/>
           </a:p>
@@ -458,7 +459,7 @@
           <a:p>
             <a:fld id="{AB513B0F-27F6-4823-A85B-BB3CFE0DE5B8}" type="datetimeFigureOut">
               <a:rPr lang="it-IT" smtClean="0"/>
-              <a:t>18/11/2011</a:t>
+              <a:t>20/11/2011</a:t>
             </a:fld>
             <a:endParaRPr lang="it-IT"/>
           </a:p>
@@ -638,7 +639,7 @@
           <a:p>
             <a:fld id="{AB513B0F-27F6-4823-A85B-BB3CFE0DE5B8}" type="datetimeFigureOut">
               <a:rPr lang="it-IT" smtClean="0"/>
-              <a:t>18/11/2011</a:t>
+              <a:t>20/11/2011</a:t>
             </a:fld>
             <a:endParaRPr lang="it-IT"/>
           </a:p>
@@ -808,7 +809,7 @@
           <a:p>
             <a:fld id="{AB513B0F-27F6-4823-A85B-BB3CFE0DE5B8}" type="datetimeFigureOut">
               <a:rPr lang="it-IT" smtClean="0"/>
-              <a:t>18/11/2011</a:t>
+              <a:t>20/11/2011</a:t>
             </a:fld>
             <a:endParaRPr lang="it-IT"/>
           </a:p>
@@ -1054,7 +1055,7 @@
           <a:p>
             <a:fld id="{AB513B0F-27F6-4823-A85B-BB3CFE0DE5B8}" type="datetimeFigureOut">
               <a:rPr lang="it-IT" smtClean="0"/>
-              <a:t>18/11/2011</a:t>
+              <a:t>20/11/2011</a:t>
             </a:fld>
             <a:endParaRPr lang="it-IT"/>
           </a:p>
@@ -1342,7 +1343,7 @@
           <a:p>
             <a:fld id="{AB513B0F-27F6-4823-A85B-BB3CFE0DE5B8}" type="datetimeFigureOut">
               <a:rPr lang="it-IT" smtClean="0"/>
-              <a:t>18/11/2011</a:t>
+              <a:t>20/11/2011</a:t>
             </a:fld>
             <a:endParaRPr lang="it-IT"/>
           </a:p>
@@ -1764,7 +1765,7 @@
           <a:p>
             <a:fld id="{AB513B0F-27F6-4823-A85B-BB3CFE0DE5B8}" type="datetimeFigureOut">
               <a:rPr lang="it-IT" smtClean="0"/>
-              <a:t>18/11/2011</a:t>
+              <a:t>20/11/2011</a:t>
             </a:fld>
             <a:endParaRPr lang="it-IT"/>
           </a:p>
@@ -1882,7 +1883,7 @@
           <a:p>
             <a:fld id="{AB513B0F-27F6-4823-A85B-BB3CFE0DE5B8}" type="datetimeFigureOut">
               <a:rPr lang="it-IT" smtClean="0"/>
-              <a:t>18/11/2011</a:t>
+              <a:t>20/11/2011</a:t>
             </a:fld>
             <a:endParaRPr lang="it-IT"/>
           </a:p>
@@ -1977,7 +1978,7 @@
           <a:p>
             <a:fld id="{AB513B0F-27F6-4823-A85B-BB3CFE0DE5B8}" type="datetimeFigureOut">
               <a:rPr lang="it-IT" smtClean="0"/>
-              <a:t>18/11/2011</a:t>
+              <a:t>20/11/2011</a:t>
             </a:fld>
             <a:endParaRPr lang="it-IT"/>
           </a:p>
@@ -2254,7 +2255,7 @@
           <a:p>
             <a:fld id="{AB513B0F-27F6-4823-A85B-BB3CFE0DE5B8}" type="datetimeFigureOut">
               <a:rPr lang="it-IT" smtClean="0"/>
-              <a:t>18/11/2011</a:t>
+              <a:t>20/11/2011</a:t>
             </a:fld>
             <a:endParaRPr lang="it-IT"/>
           </a:p>
@@ -2507,7 +2508,7 @@
           <a:p>
             <a:fld id="{AB513B0F-27F6-4823-A85B-BB3CFE0DE5B8}" type="datetimeFigureOut">
               <a:rPr lang="it-IT" smtClean="0"/>
-              <a:t>18/11/2011</a:t>
+              <a:t>20/11/2011</a:t>
             </a:fld>
             <a:endParaRPr lang="it-IT"/>
           </a:p>
@@ -2720,7 +2721,7 @@
           <a:p>
             <a:fld id="{AB513B0F-27F6-4823-A85B-BB3CFE0DE5B8}" type="datetimeFigureOut">
               <a:rPr lang="it-IT" smtClean="0"/>
-              <a:t>18/11/2011</a:t>
+              <a:t>20/11/2011</a:t>
             </a:fld>
             <a:endParaRPr lang="it-IT"/>
           </a:p>
@@ -4939,7 +4940,6 @@
                 <a:rPr lang="it-IT" dirty="0" smtClean="0"/>
                 <a:t>Quit</a:t>
               </a:r>
-              <a:endParaRPr lang="it-IT" dirty="0" smtClean="0"/>
             </a:p>
           </p:txBody>
         </p:sp>
@@ -4948,6 +4948,656 @@
     <p:extLst>
       <p:ext uri="{BB962C8B-B14F-4D97-AF65-F5344CB8AC3E}">
         <p14:creationId xmlns:p14="http://schemas.microsoft.com/office/powerpoint/2010/main" val="3146873513"/>
+      </p:ext>
+    </p:extLst>
+  </p:cSld>
+  <p:clrMapOvr>
+    <a:masterClrMapping/>
+  </p:clrMapOvr>
+</p:sld>
+</file>
+
+<file path=ppt/slides/slide2.xml><?xml version="1.0" encoding="utf-8"?>
+<p:sld xmlns:a="http://schemas.openxmlformats.org/drawingml/2006/main" xmlns:r="http://schemas.openxmlformats.org/officeDocument/2006/relationships" xmlns:p="http://schemas.openxmlformats.org/presentationml/2006/main">
+  <p:cSld>
+    <p:spTree>
+      <p:nvGrpSpPr>
+        <p:cNvPr id="1" name=""/>
+        <p:cNvGrpSpPr/>
+        <p:nvPr/>
+      </p:nvGrpSpPr>
+      <p:grpSpPr>
+        <a:xfrm>
+          <a:off x="0" y="0"/>
+          <a:ext cx="0" cy="0"/>
+          <a:chOff x="0" y="0"/>
+          <a:chExt cx="0" cy="0"/>
+        </a:xfrm>
+      </p:grpSpPr>
+      <p:cxnSp>
+        <p:nvCxnSpPr>
+          <p:cNvPr id="6" name="Elbow Connector 5"/>
+          <p:cNvCxnSpPr>
+            <a:stCxn id="2" idx="4"/>
+            <a:endCxn id="30" idx="2"/>
+          </p:cNvCxnSpPr>
+          <p:nvPr/>
+        </p:nvCxnSpPr>
+        <p:spPr>
+          <a:xfrm rot="16200000" flipH="1" flipV="1">
+            <a:off x="2795505" y="44202"/>
+            <a:ext cx="21867" cy="2283231"/>
+          </a:xfrm>
+          <a:prstGeom prst="bentConnector5">
+            <a:avLst>
+              <a:gd name="adj1" fmla="val 64005"/>
+              <a:gd name="adj2" fmla="val 29589"/>
+              <a:gd name="adj3" fmla="val 1145411"/>
+            </a:avLst>
+          </a:prstGeom>
+          <a:ln w="28575">
+            <a:tailEnd type="arrow"/>
+          </a:ln>
+        </p:spPr>
+        <p:style>
+          <a:lnRef idx="1">
+            <a:schemeClr val="accent1"/>
+          </a:lnRef>
+          <a:fillRef idx="0">
+            <a:schemeClr val="accent1"/>
+          </a:fillRef>
+          <a:effectRef idx="0">
+            <a:schemeClr val="accent1"/>
+          </a:effectRef>
+          <a:fontRef idx="minor">
+            <a:schemeClr val="tx1"/>
+          </a:fontRef>
+        </p:style>
+      </p:cxnSp>
+      <p:cxnSp>
+        <p:nvCxnSpPr>
+          <p:cNvPr id="7" name="Elbow Connector 6"/>
+          <p:cNvCxnSpPr>
+            <a:stCxn id="2" idx="5"/>
+          </p:cNvCxnSpPr>
+          <p:nvPr/>
+        </p:nvCxnSpPr>
+        <p:spPr>
+          <a:xfrm rot="10800000" flipV="1">
+            <a:off x="2459848" y="2002922"/>
+            <a:ext cx="1754715" cy="1451611"/>
+          </a:xfrm>
+          <a:prstGeom prst="bentConnector3">
+            <a:avLst>
+              <a:gd name="adj1" fmla="val 50000"/>
+            </a:avLst>
+          </a:prstGeom>
+          <a:ln w="28575">
+            <a:tailEnd type="arrow"/>
+          </a:ln>
+        </p:spPr>
+        <p:style>
+          <a:lnRef idx="1">
+            <a:schemeClr val="accent1"/>
+          </a:lnRef>
+          <a:fillRef idx="0">
+            <a:schemeClr val="accent1"/>
+          </a:fillRef>
+          <a:effectRef idx="0">
+            <a:schemeClr val="accent1"/>
+          </a:effectRef>
+          <a:fontRef idx="minor">
+            <a:schemeClr val="tx1"/>
+          </a:fontRef>
+        </p:style>
+      </p:cxnSp>
+      <p:cxnSp>
+        <p:nvCxnSpPr>
+          <p:cNvPr id="10" name="Elbow Connector 9"/>
+          <p:cNvCxnSpPr>
+            <a:stCxn id="2" idx="0"/>
+          </p:cNvCxnSpPr>
+          <p:nvPr/>
+        </p:nvCxnSpPr>
+        <p:spPr>
+          <a:xfrm rot="16200000" flipH="1">
+            <a:off x="4787815" y="2302199"/>
+            <a:ext cx="1592293" cy="1000422"/>
+          </a:xfrm>
+          <a:prstGeom prst="bentConnector3">
+            <a:avLst>
+              <a:gd name="adj1" fmla="val 50000"/>
+            </a:avLst>
+          </a:prstGeom>
+          <a:ln w="28575">
+            <a:tailEnd type="arrow"/>
+          </a:ln>
+        </p:spPr>
+        <p:style>
+          <a:lnRef idx="1">
+            <a:schemeClr val="accent1"/>
+          </a:lnRef>
+          <a:fillRef idx="0">
+            <a:schemeClr val="accent1"/>
+          </a:fillRef>
+          <a:effectRef idx="0">
+            <a:schemeClr val="accent1"/>
+          </a:effectRef>
+          <a:fontRef idx="minor">
+            <a:schemeClr val="tx1"/>
+          </a:fontRef>
+        </p:style>
+      </p:cxnSp>
+      <p:cxnSp>
+        <p:nvCxnSpPr>
+          <p:cNvPr id="13" name="Elbow Connector 12"/>
+          <p:cNvCxnSpPr>
+            <a:stCxn id="2" idx="1"/>
+            <a:endCxn id="78" idx="1"/>
+          </p:cNvCxnSpPr>
+          <p:nvPr/>
+        </p:nvCxnSpPr>
+        <p:spPr>
+          <a:xfrm flipV="1">
+            <a:off x="5354430" y="707429"/>
+            <a:ext cx="1737850" cy="472862"/>
+          </a:xfrm>
+          <a:prstGeom prst="bentConnector3">
+            <a:avLst>
+              <a:gd name="adj1" fmla="val 50000"/>
+            </a:avLst>
+          </a:prstGeom>
+          <a:ln w="28575">
+            <a:tailEnd type="arrow"/>
+          </a:ln>
+        </p:spPr>
+        <p:style>
+          <a:lnRef idx="1">
+            <a:schemeClr val="accent1"/>
+          </a:lnRef>
+          <a:fillRef idx="0">
+            <a:schemeClr val="accent1"/>
+          </a:fillRef>
+          <a:effectRef idx="0">
+            <a:schemeClr val="accent1"/>
+          </a:effectRef>
+          <a:fontRef idx="minor">
+            <a:schemeClr val="tx1"/>
+          </a:fontRef>
+        </p:style>
+      </p:cxnSp>
+      <p:grpSp>
+        <p:nvGrpSpPr>
+          <p:cNvPr id="29" name="Group 28"/>
+          <p:cNvGrpSpPr/>
+          <p:nvPr/>
+        </p:nvGrpSpPr>
+        <p:grpSpPr>
+          <a:xfrm>
+            <a:off x="3338129" y="718237"/>
+            <a:ext cx="2602023" cy="1414619"/>
+            <a:chOff x="3338129" y="260648"/>
+            <a:chExt cx="2602023" cy="1414619"/>
+          </a:xfrm>
+        </p:grpSpPr>
+        <p:grpSp>
+          <p:nvGrpSpPr>
+            <p:cNvPr id="4" name="Group 3"/>
+            <p:cNvGrpSpPr/>
+            <p:nvPr/>
+          </p:nvGrpSpPr>
+          <p:grpSpPr>
+            <a:xfrm>
+              <a:off x="3989164" y="336494"/>
+              <a:ext cx="1405712" cy="1338773"/>
+              <a:chOff x="3989164" y="336494"/>
+              <a:chExt cx="1405712" cy="1338773"/>
+            </a:xfrm>
+          </p:grpSpPr>
+          <p:sp>
+            <p:nvSpPr>
+              <p:cNvPr id="2" name="Regular Pentagon 1"/>
+              <p:cNvSpPr/>
+              <p:nvPr/>
+            </p:nvSpPr>
+            <p:spPr>
+              <a:xfrm rot="8650941">
+                <a:off x="3989164" y="336494"/>
+                <a:ext cx="1405712" cy="1338773"/>
+              </a:xfrm>
+              <a:prstGeom prst="pentagon">
+                <a:avLst/>
+              </a:prstGeom>
+            </p:spPr>
+            <p:style>
+              <a:lnRef idx="2">
+                <a:schemeClr val="accent1">
+                  <a:shade val="50000"/>
+                </a:schemeClr>
+              </a:lnRef>
+              <a:fillRef idx="1">
+                <a:schemeClr val="accent1"/>
+              </a:fillRef>
+              <a:effectRef idx="0">
+                <a:schemeClr val="accent1"/>
+              </a:effectRef>
+              <a:fontRef idx="minor">
+                <a:schemeClr val="lt1"/>
+              </a:fontRef>
+            </p:style>
+            <p:txBody>
+              <a:bodyPr rtlCol="0" anchor="ctr"/>
+              <a:lstStyle/>
+              <a:p>
+                <a:pPr algn="ctr"/>
+                <a:endParaRPr lang="it-IT" dirty="0"/>
+              </a:p>
+            </p:txBody>
+          </p:sp>
+          <p:sp>
+            <p:nvSpPr>
+              <p:cNvPr id="3" name="TextBox 2"/>
+              <p:cNvSpPr txBox="1"/>
+              <p:nvPr/>
+            </p:nvSpPr>
+            <p:spPr>
+              <a:xfrm>
+                <a:off x="3995936" y="683404"/>
+                <a:ext cx="1220399" cy="369332"/>
+              </a:xfrm>
+              <a:prstGeom prst="rect">
+                <a:avLst/>
+              </a:prstGeom>
+              <a:noFill/>
+            </p:spPr>
+            <p:txBody>
+              <a:bodyPr wrap="none" rtlCol="0">
+                <a:spAutoFit/>
+              </a:bodyPr>
+              <a:lstStyle/>
+              <a:p>
+                <a:r>
+                  <a:rPr lang="it-IT" b="1" dirty="0" smtClean="0">
+                    <a:solidFill>
+                      <a:schemeClr val="bg1"/>
+                    </a:solidFill>
+                  </a:rPr>
+                  <a:t>The Logger</a:t>
+                </a:r>
+                <a:endParaRPr lang="it-IT" b="1" dirty="0">
+                  <a:solidFill>
+                    <a:schemeClr val="bg1"/>
+                  </a:solidFill>
+                </a:endParaRPr>
+              </a:p>
+            </p:txBody>
+          </p:sp>
+        </p:grpSp>
+        <p:sp>
+          <p:nvSpPr>
+            <p:cNvPr id="24" name="TextBox 23"/>
+            <p:cNvSpPr txBox="1"/>
+            <p:nvPr/>
+          </p:nvSpPr>
+          <p:spPr>
+            <a:xfrm>
+              <a:off x="3429117" y="260648"/>
+              <a:ext cx="782843" cy="369332"/>
+            </a:xfrm>
+            <a:prstGeom prst="rect">
+              <a:avLst/>
+            </a:prstGeom>
+            <a:noFill/>
+          </p:spPr>
+          <p:txBody>
+            <a:bodyPr wrap="none" rtlCol="0">
+              <a:spAutoFit/>
+            </a:bodyPr>
+            <a:lstStyle/>
+            <a:p>
+              <a:r>
+                <a:rPr lang="it-IT" dirty="0" smtClean="0"/>
+                <a:t>Config</a:t>
+              </a:r>
+              <a:endParaRPr lang="it-IT" dirty="0"/>
+            </a:p>
+          </p:txBody>
+        </p:sp>
+        <p:sp>
+          <p:nvSpPr>
+            <p:cNvPr id="25" name="TextBox 24"/>
+            <p:cNvSpPr txBox="1"/>
+            <p:nvPr/>
+          </p:nvSpPr>
+          <p:spPr>
+            <a:xfrm>
+              <a:off x="3338129" y="1196752"/>
+              <a:ext cx="801823" cy="369332"/>
+            </a:xfrm>
+            <a:prstGeom prst="rect">
+              <a:avLst/>
+            </a:prstGeom>
+            <a:noFill/>
+          </p:spPr>
+          <p:txBody>
+            <a:bodyPr wrap="none" rtlCol="0">
+              <a:spAutoFit/>
+            </a:bodyPr>
+            <a:lstStyle/>
+            <a:p>
+              <a:r>
+                <a:rPr lang="it-IT" dirty="0" smtClean="0"/>
+                <a:t>Online</a:t>
+              </a:r>
+            </a:p>
+          </p:txBody>
+        </p:sp>
+        <p:sp>
+          <p:nvSpPr>
+            <p:cNvPr id="26" name="TextBox 25"/>
+            <p:cNvSpPr txBox="1"/>
+            <p:nvPr/>
+          </p:nvSpPr>
+          <p:spPr>
+            <a:xfrm>
+              <a:off x="5121338" y="1196752"/>
+              <a:ext cx="818814" cy="369332"/>
+            </a:xfrm>
+            <a:prstGeom prst="rect">
+              <a:avLst/>
+            </a:prstGeom>
+            <a:noFill/>
+          </p:spPr>
+          <p:txBody>
+            <a:bodyPr wrap="none" rtlCol="0">
+              <a:spAutoFit/>
+            </a:bodyPr>
+            <a:lstStyle/>
+            <a:p>
+              <a:r>
+                <a:rPr lang="it-IT" dirty="0" smtClean="0"/>
+                <a:t>Offline</a:t>
+              </a:r>
+            </a:p>
+          </p:txBody>
+        </p:sp>
+        <p:sp>
+          <p:nvSpPr>
+            <p:cNvPr id="27" name="TextBox 26"/>
+            <p:cNvSpPr txBox="1"/>
+            <p:nvPr/>
+          </p:nvSpPr>
+          <p:spPr>
+            <a:xfrm>
+              <a:off x="5292080" y="404664"/>
+              <a:ext cx="526106" cy="369332"/>
+            </a:xfrm>
+            <a:prstGeom prst="rect">
+              <a:avLst/>
+            </a:prstGeom>
+            <a:noFill/>
+          </p:spPr>
+          <p:txBody>
+            <a:bodyPr wrap="none" rtlCol="0">
+              <a:spAutoFit/>
+            </a:bodyPr>
+            <a:lstStyle/>
+            <a:p>
+              <a:r>
+                <a:rPr lang="it-IT" dirty="0" smtClean="0"/>
+                <a:t>Exit</a:t>
+              </a:r>
+            </a:p>
+          </p:txBody>
+        </p:sp>
+      </p:grpSp>
+      <p:cxnSp>
+        <p:nvCxnSpPr>
+          <p:cNvPr id="46" name="Elbow Connector 45"/>
+          <p:cNvCxnSpPr>
+            <a:stCxn id="2" idx="2"/>
+            <a:endCxn id="30" idx="0"/>
+          </p:cNvCxnSpPr>
+          <p:nvPr/>
+        </p:nvCxnSpPr>
+        <p:spPr>
+          <a:xfrm rot="16200000" flipH="1" flipV="1">
+            <a:off x="3128152" y="-796859"/>
+            <a:ext cx="61050" cy="2987707"/>
+          </a:xfrm>
+          <a:prstGeom prst="bentConnector3">
+            <a:avLst>
+              <a:gd name="adj1" fmla="val -855225"/>
+            </a:avLst>
+          </a:prstGeom>
+          <a:ln w="28575">
+            <a:headEnd type="arrow"/>
+            <a:tailEnd type="none"/>
+          </a:ln>
+        </p:spPr>
+        <p:style>
+          <a:lnRef idx="1">
+            <a:schemeClr val="accent1"/>
+          </a:lnRef>
+          <a:fillRef idx="0">
+            <a:schemeClr val="accent1"/>
+          </a:fillRef>
+          <a:effectRef idx="0">
+            <a:schemeClr val="accent1"/>
+          </a:effectRef>
+          <a:fontRef idx="minor">
+            <a:schemeClr val="tx1"/>
+          </a:fontRef>
+        </p:style>
+      </p:cxnSp>
+      <p:cxnSp>
+        <p:nvCxnSpPr>
+          <p:cNvPr id="52" name="Elbow Connector 51"/>
+          <p:cNvCxnSpPr>
+            <a:stCxn id="2" idx="2"/>
+            <a:endCxn id="30" idx="1"/>
+          </p:cNvCxnSpPr>
+          <p:nvPr/>
+        </p:nvCxnSpPr>
+        <p:spPr>
+          <a:xfrm rot="16200000" flipH="1" flipV="1">
+            <a:off x="2565367" y="-1125028"/>
+            <a:ext cx="295666" cy="3878661"/>
+          </a:xfrm>
+          <a:prstGeom prst="bentConnector4">
+            <a:avLst>
+              <a:gd name="adj1" fmla="val -176590"/>
+              <a:gd name="adj2" fmla="val 105894"/>
+            </a:avLst>
+          </a:prstGeom>
+          <a:ln w="28575">
+            <a:headEnd type="arrow"/>
+            <a:tailEnd type="none"/>
+          </a:ln>
+        </p:spPr>
+        <p:style>
+          <a:lnRef idx="1">
+            <a:schemeClr val="accent1"/>
+          </a:lnRef>
+          <a:fillRef idx="0">
+            <a:schemeClr val="accent1"/>
+          </a:fillRef>
+          <a:effectRef idx="0">
+            <a:schemeClr val="accent1"/>
+          </a:effectRef>
+          <a:fontRef idx="minor">
+            <a:schemeClr val="tx1"/>
+          </a:fontRef>
+        </p:style>
+      </p:cxnSp>
+      <p:grpSp>
+        <p:nvGrpSpPr>
+          <p:cNvPr id="62" name="Group 61"/>
+          <p:cNvGrpSpPr/>
+          <p:nvPr/>
+        </p:nvGrpSpPr>
+        <p:grpSpPr>
+          <a:xfrm>
+            <a:off x="532717" y="401105"/>
+            <a:ext cx="2023059" cy="795647"/>
+            <a:chOff x="226392" y="1475492"/>
+            <a:chExt cx="2023059" cy="795647"/>
+          </a:xfrm>
+        </p:grpSpPr>
+        <p:sp>
+          <p:nvSpPr>
+            <p:cNvPr id="30" name="Rectangle 29"/>
+            <p:cNvSpPr/>
+            <p:nvPr/>
+          </p:nvSpPr>
+          <p:spPr>
+            <a:xfrm>
+              <a:off x="467544" y="1801907"/>
+              <a:ext cx="1781907" cy="469232"/>
+            </a:xfrm>
+            <a:prstGeom prst="rect">
+              <a:avLst/>
+            </a:prstGeom>
+          </p:spPr>
+          <p:style>
+            <a:lnRef idx="2">
+              <a:schemeClr val="accent1">
+                <a:shade val="50000"/>
+              </a:schemeClr>
+            </a:lnRef>
+            <a:fillRef idx="1">
+              <a:schemeClr val="accent1"/>
+            </a:fillRef>
+            <a:effectRef idx="0">
+              <a:schemeClr val="accent1"/>
+            </a:effectRef>
+            <a:fontRef idx="minor">
+              <a:schemeClr val="lt1"/>
+            </a:fontRef>
+          </p:style>
+          <p:txBody>
+            <a:bodyPr rtlCol="0" anchor="ctr"/>
+            <a:lstStyle/>
+            <a:p>
+              <a:pPr algn="ctr"/>
+              <a:r>
+                <a:rPr lang="it-IT" dirty="0"/>
+                <a:t>IniFilePopulator</a:t>
+              </a:r>
+              <a:endParaRPr lang="it-IT" dirty="0"/>
+            </a:p>
+          </p:txBody>
+        </p:sp>
+        <p:sp>
+          <p:nvSpPr>
+            <p:cNvPr id="60" name="TextBox 59"/>
+            <p:cNvSpPr txBox="1"/>
+            <p:nvPr/>
+          </p:nvSpPr>
+          <p:spPr>
+            <a:xfrm>
+              <a:off x="1412893" y="1475492"/>
+              <a:ext cx="457176" cy="369332"/>
+            </a:xfrm>
+            <a:prstGeom prst="rect">
+              <a:avLst/>
+            </a:prstGeom>
+            <a:noFill/>
+          </p:spPr>
+          <p:txBody>
+            <a:bodyPr wrap="none" rtlCol="0">
+              <a:spAutoFit/>
+            </a:bodyPr>
+            <a:lstStyle/>
+            <a:p>
+              <a:r>
+                <a:rPr lang="it-IT" dirty="0" smtClean="0"/>
+                <a:t>OK</a:t>
+              </a:r>
+            </a:p>
+          </p:txBody>
+        </p:sp>
+        <p:sp>
+          <p:nvSpPr>
+            <p:cNvPr id="61" name="TextBox 60"/>
+            <p:cNvSpPr txBox="1"/>
+            <p:nvPr/>
+          </p:nvSpPr>
+          <p:spPr>
+            <a:xfrm>
+              <a:off x="226392" y="1475492"/>
+              <a:ext cx="806631" cy="369332"/>
+            </a:xfrm>
+            <a:prstGeom prst="rect">
+              <a:avLst/>
+            </a:prstGeom>
+            <a:noFill/>
+          </p:spPr>
+          <p:txBody>
+            <a:bodyPr wrap="none" rtlCol="0">
+              <a:spAutoFit/>
+            </a:bodyPr>
+            <a:lstStyle/>
+            <a:p>
+              <a:r>
+                <a:rPr lang="it-IT" dirty="0" smtClean="0"/>
+                <a:t>Cancel</a:t>
+              </a:r>
+            </a:p>
+          </p:txBody>
+        </p:sp>
+      </p:grpSp>
+      <p:sp>
+        <p:nvSpPr>
+          <p:cNvPr id="78" name="Flowchart: Process 77"/>
+          <p:cNvSpPr/>
+          <p:nvPr/>
+        </p:nvSpPr>
+        <p:spPr>
+          <a:xfrm>
+            <a:off x="7092280" y="401105"/>
+            <a:ext cx="914400" cy="612648"/>
+          </a:xfrm>
+          <a:prstGeom prst="flowChartProcess">
+            <a:avLst/>
+          </a:prstGeom>
+          <a:solidFill>
+            <a:srgbClr val="FF0000"/>
+          </a:solidFill>
+        </p:spPr>
+        <p:style>
+          <a:lnRef idx="2">
+            <a:schemeClr val="accent1">
+              <a:shade val="50000"/>
+            </a:schemeClr>
+          </a:lnRef>
+          <a:fillRef idx="1">
+            <a:schemeClr val="accent1"/>
+          </a:fillRef>
+          <a:effectRef idx="0">
+            <a:schemeClr val="accent1"/>
+          </a:effectRef>
+          <a:fontRef idx="minor">
+            <a:schemeClr val="lt1"/>
+          </a:fontRef>
+        </p:style>
+        <p:txBody>
+          <a:bodyPr rtlCol="0" anchor="ctr"/>
+          <a:lstStyle/>
+          <a:p>
+            <a:pPr algn="ctr"/>
+            <a:r>
+              <a:rPr lang="it-IT" dirty="0" smtClean="0"/>
+              <a:t>END</a:t>
+            </a:r>
+            <a:endParaRPr lang="it-IT" dirty="0"/>
+          </a:p>
+        </p:txBody>
+      </p:sp>
+    </p:spTree>
+    <p:extLst>
+      <p:ext uri="{BB962C8B-B14F-4D97-AF65-F5344CB8AC3E}">
+        <p14:creationId xmlns:p14="http://schemas.microsoft.com/office/powerpoint/2010/main" val="2297671295"/>
       </p:ext>
     </p:extLst>
   </p:cSld>

</xml_diff>

<commit_message>
nuova classe Repository per contenere i dati comuni
</commit_message>
<xml_diff>
--- a/FlowDiagram.pptx
+++ b/FlowDiagram.pptx
@@ -4985,29 +4985,29 @@
         </p:nvCxnSpPr>
         <p:spPr>
           <a:xfrm rot="16200000" flipH="1" flipV="1">
-            <a:off x="2795505" y="44202"/>
-            <a:ext cx="21867" cy="2283231"/>
+            <a:off x="2720969" y="113682"/>
+            <a:ext cx="165883" cy="2288287"/>
           </a:xfrm>
           <a:prstGeom prst="bentConnector5">
             <a:avLst>
-              <a:gd name="adj1" fmla="val 64005"/>
-              <a:gd name="adj2" fmla="val 29589"/>
-              <a:gd name="adj3" fmla="val 1145411"/>
+              <a:gd name="adj1" fmla="val -137808"/>
+              <a:gd name="adj2" fmla="val 29634"/>
+              <a:gd name="adj3" fmla="val 237808"/>
             </a:avLst>
           </a:prstGeom>
-          <a:ln w="28575">
+          <a:ln>
             <a:tailEnd type="arrow"/>
           </a:ln>
         </p:spPr>
         <p:style>
-          <a:lnRef idx="1">
-            <a:schemeClr val="accent1"/>
+          <a:lnRef idx="3">
+            <a:schemeClr val="accent3"/>
           </a:lnRef>
           <a:fillRef idx="0">
-            <a:schemeClr val="accent1"/>
+            <a:schemeClr val="accent3"/>
           </a:fillRef>
-          <a:effectRef idx="0">
-            <a:schemeClr val="accent1"/>
+          <a:effectRef idx="2">
+            <a:schemeClr val="accent3"/>
           </a:effectRef>
           <a:fontRef idx="minor">
             <a:schemeClr val="tx1"/>
@@ -5362,28 +5362,28 @@
         </p:nvCxnSpPr>
         <p:spPr>
           <a:xfrm rot="16200000" flipH="1" flipV="1">
-            <a:off x="3128152" y="-796859"/>
-            <a:ext cx="61050" cy="2987707"/>
+            <a:off x="3053616" y="-727379"/>
+            <a:ext cx="205066" cy="2992763"/>
           </a:xfrm>
           <a:prstGeom prst="bentConnector3">
             <a:avLst>
-              <a:gd name="adj1" fmla="val -855225"/>
+              <a:gd name="adj1" fmla="val -136488"/>
             </a:avLst>
           </a:prstGeom>
-          <a:ln w="28575">
+          <a:ln>
             <a:headEnd type="arrow"/>
             <a:tailEnd type="none"/>
           </a:ln>
         </p:spPr>
         <p:style>
-          <a:lnRef idx="1">
-            <a:schemeClr val="accent1"/>
+          <a:lnRef idx="3">
+            <a:schemeClr val="accent3"/>
           </a:lnRef>
           <a:fillRef idx="0">
-            <a:schemeClr val="accent1"/>
+            <a:schemeClr val="accent3"/>
           </a:fillRef>
-          <a:effectRef idx="0">
-            <a:schemeClr val="accent1"/>
+          <a:effectRef idx="2">
+            <a:schemeClr val="accent3"/>
           </a:effectRef>
           <a:fontRef idx="minor">
             <a:schemeClr val="tx1"/>
@@ -5401,29 +5401,29 @@
         </p:nvCxnSpPr>
         <p:spPr>
           <a:xfrm rot="16200000" flipH="1" flipV="1">
-            <a:off x="2565367" y="-1125028"/>
-            <a:ext cx="295666" cy="3878661"/>
+            <a:off x="2490831" y="-1055548"/>
+            <a:ext cx="439682" cy="3883717"/>
           </a:xfrm>
           <a:prstGeom prst="bentConnector4">
             <a:avLst>
-              <a:gd name="adj1" fmla="val -176590"/>
-              <a:gd name="adj2" fmla="val 105894"/>
+              <a:gd name="adj1" fmla="val -113390"/>
+              <a:gd name="adj2" fmla="val 105886"/>
             </a:avLst>
           </a:prstGeom>
-          <a:ln w="28575">
+          <a:ln>
             <a:headEnd type="arrow"/>
             <a:tailEnd type="none"/>
           </a:ln>
         </p:spPr>
         <p:style>
-          <a:lnRef idx="1">
-            <a:schemeClr val="accent1"/>
+          <a:lnRef idx="3">
+            <a:schemeClr val="accent3"/>
           </a:lnRef>
           <a:fillRef idx="0">
-            <a:schemeClr val="accent1"/>
+            <a:schemeClr val="accent3"/>
           </a:fillRef>
-          <a:effectRef idx="0">
-            <a:schemeClr val="accent1"/>
+          <a:effectRef idx="2">
+            <a:schemeClr val="accent3"/>
           </a:effectRef>
           <a:fontRef idx="minor">
             <a:schemeClr val="tx1"/>
@@ -5438,7 +5438,7 @@
         </p:nvGrpSpPr>
         <p:grpSpPr>
           <a:xfrm>
-            <a:off x="532717" y="401105"/>
+            <a:off x="527661" y="545121"/>
             <a:ext cx="2023059" cy="795647"/>
             <a:chOff x="226392" y="1475492"/>
             <a:chExt cx="2023059" cy="795647"/>
@@ -5484,7 +5484,6 @@
                 <a:rPr lang="it-IT" dirty="0"/>
                 <a:t>IniFilePopulator</a:t>
               </a:r>
-              <a:endParaRPr lang="it-IT" dirty="0"/>
             </a:p>
           </p:txBody>
         </p:sp>

</xml_diff>